<commit_message>
Modified exercise slides to reflect new notebook naming convention.
</commit_message>
<xml_diff>
--- a/presentations/01_rnn_intro.pptx
+++ b/presentations/01_rnn_intro.pptx
@@ -5,7 +5,7 @@
     <p:sldMasterId id="2147483648" r:id="rId1"/>
   </p:sldMasterIdLst>
   <p:notesMasterIdLst>
-    <p:notesMasterId r:id="rId17"/>
+    <p:notesMasterId r:id="rId18"/>
   </p:notesMasterIdLst>
   <p:sldIdLst>
     <p:sldId id="257" r:id="rId2"/>
@@ -22,7 +22,8 @@
     <p:sldId id="320" r:id="rId13"/>
     <p:sldId id="318" r:id="rId14"/>
     <p:sldId id="317" r:id="rId15"/>
-    <p:sldId id="310" r:id="rId16"/>
+    <p:sldId id="321" r:id="rId16"/>
+    <p:sldId id="310" r:id="rId17"/>
   </p:sldIdLst>
   <p:sldSz cx="12192000" cy="6858000"/>
   <p:notesSz cx="6858000" cy="9144000"/>
@@ -222,7 +223,7 @@
           <a:p>
             <a:fld id="{FD93C9B2-20F6-4DB1-B471-224337D0AC79}" type="datetimeFigureOut">
               <a:rPr lang="en-US" smtClean="0"/>
-              <a:t>11/23/2021</a:t>
+              <a:t>3/16/2022</a:t>
             </a:fld>
             <a:endParaRPr lang="en-US"/>
           </a:p>
@@ -1328,7 +1329,7 @@
             </a:pPr>
             <a:r>
               <a:rPr lang="en-US" dirty="0"/>
-              <a:t>Exercise 5.03 starts on page 243 of the textbook.  For additional information, please watch the exercise 5.03 orientation video.</a:t>
+              <a:t>Exercise 5.03 starts on page 243 of the textbook.  </a:t>
             </a:r>
           </a:p>
           <a:p>
@@ -1416,145 +1417,6 @@
           <a:bodyPr/>
           <a:lstStyle/>
           <a:p>
-            <a:r>
-              <a:rPr lang="en-US" dirty="0"/>
-              <a:t>This is made a little clearer if you look at how recurrent neurons work beside each other across time steps, which you can see here.</a:t>
-            </a:r>
-          </a:p>
-          <a:p>
-            <a:endParaRPr lang="en-US" dirty="0"/>
-          </a:p>
-          <a:p>
-            <a:r>
-              <a:rPr lang="en-US" b="0" i="0" dirty="0">
-                <a:solidFill>
-                  <a:srgbClr val="3D3B49"/>
-                </a:solidFill>
-                <a:effectLst/>
-                <a:latin typeface="Noto serif"/>
-              </a:rPr>
-              <a:t>Here, x</a:t>
-            </a:r>
-            <a:r>
-              <a:rPr lang="en-US" b="1" i="0" baseline="-25000" dirty="0">
-                <a:solidFill>
-                  <a:srgbClr val="3D3B49"/>
-                </a:solidFill>
-                <a:effectLst/>
-                <a:latin typeface="Noto serif"/>
-              </a:rPr>
-              <a:t>0</a:t>
-            </a:r>
-            <a:r>
-              <a:rPr lang="en-US" b="0" i="0" dirty="0">
-                <a:solidFill>
-                  <a:srgbClr val="3D3B49"/>
-                </a:solidFill>
-                <a:effectLst/>
-                <a:latin typeface="Noto serif"/>
-              </a:rPr>
-              <a:t> is operated on to get y</a:t>
-            </a:r>
-            <a:r>
-              <a:rPr lang="en-US" b="1" i="0" baseline="-25000" dirty="0">
-                <a:solidFill>
-                  <a:srgbClr val="3D3B49"/>
-                </a:solidFill>
-                <a:effectLst/>
-                <a:latin typeface="Noto serif"/>
-              </a:rPr>
-              <a:t>0</a:t>
-            </a:r>
-            <a:r>
-              <a:rPr lang="en-US" b="0" i="0" dirty="0">
-                <a:solidFill>
-                  <a:srgbClr val="3D3B49"/>
-                </a:solidFill>
-                <a:effectLst/>
-                <a:latin typeface="Noto serif"/>
-              </a:rPr>
-              <a:t> and a value that’s passed forward. The next step gets that value and x</a:t>
-            </a:r>
-            <a:r>
-              <a:rPr lang="en-US" b="1" i="0" baseline="-25000" dirty="0">
-                <a:solidFill>
-                  <a:srgbClr val="3D3B49"/>
-                </a:solidFill>
-                <a:effectLst/>
-                <a:latin typeface="Noto serif"/>
-              </a:rPr>
-              <a:t>1</a:t>
-            </a:r>
-            <a:r>
-              <a:rPr lang="en-US" b="0" i="0" dirty="0">
-                <a:solidFill>
-                  <a:srgbClr val="3D3B49"/>
-                </a:solidFill>
-                <a:effectLst/>
-                <a:latin typeface="Noto serif"/>
-              </a:rPr>
-              <a:t> and produces y</a:t>
-            </a:r>
-            <a:r>
-              <a:rPr lang="en-US" b="1" i="0" baseline="-25000" dirty="0">
-                <a:solidFill>
-                  <a:srgbClr val="3D3B49"/>
-                </a:solidFill>
-                <a:effectLst/>
-                <a:latin typeface="Noto serif"/>
-              </a:rPr>
-              <a:t>1</a:t>
-            </a:r>
-            <a:r>
-              <a:rPr lang="en-US" b="0" i="0" dirty="0">
-                <a:solidFill>
-                  <a:srgbClr val="3D3B49"/>
-                </a:solidFill>
-                <a:effectLst/>
-                <a:latin typeface="Noto serif"/>
-              </a:rPr>
-              <a:t> and a value that’s passed forward. The next one gets that value and x</a:t>
-            </a:r>
-            <a:r>
-              <a:rPr lang="en-US" b="1" i="0" baseline="-25000" dirty="0">
-                <a:solidFill>
-                  <a:srgbClr val="3D3B49"/>
-                </a:solidFill>
-                <a:effectLst/>
-                <a:latin typeface="Noto serif"/>
-              </a:rPr>
-              <a:t>2</a:t>
-            </a:r>
-            <a:r>
-              <a:rPr lang="en-US" b="0" i="0" dirty="0">
-                <a:solidFill>
-                  <a:srgbClr val="3D3B49"/>
-                </a:solidFill>
-                <a:effectLst/>
-                <a:latin typeface="Noto serif"/>
-              </a:rPr>
-              <a:t> and produces y</a:t>
-            </a:r>
-            <a:r>
-              <a:rPr lang="en-US" b="1" i="0" baseline="-25000" dirty="0">
-                <a:solidFill>
-                  <a:srgbClr val="3D3B49"/>
-                </a:solidFill>
-                <a:effectLst/>
-                <a:latin typeface="Noto serif"/>
-              </a:rPr>
-              <a:t>2</a:t>
-            </a:r>
-            <a:r>
-              <a:rPr lang="en-US" b="0" i="0" dirty="0">
-                <a:solidFill>
-                  <a:srgbClr val="3D3B49"/>
-                </a:solidFill>
-                <a:effectLst/>
-                <a:latin typeface="Noto serif"/>
-              </a:rPr>
-              <a:t> and a pass-forward value, and so on down the line. This is similar to what we saw with the Fibonacci sequence, and I always find that to be a handy mnemonic when trying to remember how an RNN works.</a:t>
-            </a:r>
             <a:endParaRPr lang="en-US" dirty="0"/>
           </a:p>
         </p:txBody>
@@ -1577,6 +1439,229 @@
             <a:fld id="{3148858F-F1DB-4027-9C85-CCA6849540DD}" type="slidenum">
               <a:rPr lang="en-US" smtClean="0"/>
               <a:t>15</a:t>
+            </a:fld>
+            <a:endParaRPr lang="en-US"/>
+          </a:p>
+        </p:txBody>
+      </p:sp>
+    </p:spTree>
+    <p:extLst>
+      <p:ext uri="{BB962C8B-B14F-4D97-AF65-F5344CB8AC3E}">
+        <p14:creationId xmlns:p14="http://schemas.microsoft.com/office/powerpoint/2010/main" val="927297939"/>
+      </p:ext>
+    </p:extLst>
+  </p:cSld>
+  <p:clrMapOvr>
+    <a:masterClrMapping/>
+  </p:clrMapOvr>
+</p:notes>
+</file>
+
+<file path=ppt/notesSlides/notesSlide16.xml><?xml version="1.0" encoding="utf-8"?>
+<p:notes xmlns:a="http://schemas.openxmlformats.org/drawingml/2006/main" xmlns:r="http://schemas.openxmlformats.org/officeDocument/2006/relationships" xmlns:p="http://schemas.openxmlformats.org/presentationml/2006/main">
+  <p:cSld>
+    <p:spTree>
+      <p:nvGrpSpPr>
+        <p:cNvPr id="1" name=""/>
+        <p:cNvGrpSpPr/>
+        <p:nvPr/>
+      </p:nvGrpSpPr>
+      <p:grpSpPr>
+        <a:xfrm>
+          <a:off x="0" y="0"/>
+          <a:ext cx="0" cy="0"/>
+          <a:chOff x="0" y="0"/>
+          <a:chExt cx="0" cy="0"/>
+        </a:xfrm>
+      </p:grpSpPr>
+      <p:sp>
+        <p:nvSpPr>
+          <p:cNvPr id="2" name="Slide Image Placeholder 1"/>
+          <p:cNvSpPr>
+            <a:spLocks noGrp="1" noRot="1" noChangeAspect="1"/>
+          </p:cNvSpPr>
+          <p:nvPr>
+            <p:ph type="sldImg"/>
+          </p:nvPr>
+        </p:nvSpPr>
+        <p:spPr/>
+      </p:sp>
+      <p:sp>
+        <p:nvSpPr>
+          <p:cNvPr id="3" name="Notes Placeholder 2"/>
+          <p:cNvSpPr>
+            <a:spLocks noGrp="1"/>
+          </p:cNvSpPr>
+          <p:nvPr>
+            <p:ph type="body" idx="1"/>
+          </p:nvPr>
+        </p:nvSpPr>
+        <p:spPr/>
+        <p:txBody>
+          <a:bodyPr/>
+          <a:lstStyle/>
+          <a:p>
+            <a:r>
+              <a:rPr lang="en-US" dirty="0"/>
+              <a:t>This is made a little clearer if you look at how recurrent neurons work beside each other across time steps, which you can see here.</a:t>
+            </a:r>
+          </a:p>
+          <a:p>
+            <a:endParaRPr lang="en-US" dirty="0"/>
+          </a:p>
+          <a:p>
+            <a:r>
+              <a:rPr lang="en-US" b="0" i="0" dirty="0">
+                <a:solidFill>
+                  <a:srgbClr val="3D3B49"/>
+                </a:solidFill>
+                <a:effectLst/>
+                <a:latin typeface="Noto serif"/>
+              </a:rPr>
+              <a:t>Here, x</a:t>
+            </a:r>
+            <a:r>
+              <a:rPr lang="en-US" b="1" i="0" baseline="-25000" dirty="0">
+                <a:solidFill>
+                  <a:srgbClr val="3D3B49"/>
+                </a:solidFill>
+                <a:effectLst/>
+                <a:latin typeface="Noto serif"/>
+              </a:rPr>
+              <a:t>0</a:t>
+            </a:r>
+            <a:r>
+              <a:rPr lang="en-US" b="0" i="0" dirty="0">
+                <a:solidFill>
+                  <a:srgbClr val="3D3B49"/>
+                </a:solidFill>
+                <a:effectLst/>
+                <a:latin typeface="Noto serif"/>
+              </a:rPr>
+              <a:t> is operated on to get y</a:t>
+            </a:r>
+            <a:r>
+              <a:rPr lang="en-US" b="1" i="0" baseline="-25000" dirty="0">
+                <a:solidFill>
+                  <a:srgbClr val="3D3B49"/>
+                </a:solidFill>
+                <a:effectLst/>
+                <a:latin typeface="Noto serif"/>
+              </a:rPr>
+              <a:t>0</a:t>
+            </a:r>
+            <a:r>
+              <a:rPr lang="en-US" b="0" i="0" dirty="0">
+                <a:solidFill>
+                  <a:srgbClr val="3D3B49"/>
+                </a:solidFill>
+                <a:effectLst/>
+                <a:latin typeface="Noto serif"/>
+              </a:rPr>
+              <a:t> and a value that’s passed forward. The next step gets that value and x</a:t>
+            </a:r>
+            <a:r>
+              <a:rPr lang="en-US" b="1" i="0" baseline="-25000" dirty="0">
+                <a:solidFill>
+                  <a:srgbClr val="3D3B49"/>
+                </a:solidFill>
+                <a:effectLst/>
+                <a:latin typeface="Noto serif"/>
+              </a:rPr>
+              <a:t>1</a:t>
+            </a:r>
+            <a:r>
+              <a:rPr lang="en-US" b="0" i="0" dirty="0">
+                <a:solidFill>
+                  <a:srgbClr val="3D3B49"/>
+                </a:solidFill>
+                <a:effectLst/>
+                <a:latin typeface="Noto serif"/>
+              </a:rPr>
+              <a:t> and produces y</a:t>
+            </a:r>
+            <a:r>
+              <a:rPr lang="en-US" b="1" i="0" baseline="-25000" dirty="0">
+                <a:solidFill>
+                  <a:srgbClr val="3D3B49"/>
+                </a:solidFill>
+                <a:effectLst/>
+                <a:latin typeface="Noto serif"/>
+              </a:rPr>
+              <a:t>1</a:t>
+            </a:r>
+            <a:r>
+              <a:rPr lang="en-US" b="0" i="0" dirty="0">
+                <a:solidFill>
+                  <a:srgbClr val="3D3B49"/>
+                </a:solidFill>
+                <a:effectLst/>
+                <a:latin typeface="Noto serif"/>
+              </a:rPr>
+              <a:t> and a value that’s passed forward. The next one gets that value and x</a:t>
+            </a:r>
+            <a:r>
+              <a:rPr lang="en-US" b="1" i="0" baseline="-25000" dirty="0">
+                <a:solidFill>
+                  <a:srgbClr val="3D3B49"/>
+                </a:solidFill>
+                <a:effectLst/>
+                <a:latin typeface="Noto serif"/>
+              </a:rPr>
+              <a:t>2</a:t>
+            </a:r>
+            <a:r>
+              <a:rPr lang="en-US" b="0" i="0" dirty="0">
+                <a:solidFill>
+                  <a:srgbClr val="3D3B49"/>
+                </a:solidFill>
+                <a:effectLst/>
+                <a:latin typeface="Noto serif"/>
+              </a:rPr>
+              <a:t> and produces y</a:t>
+            </a:r>
+            <a:r>
+              <a:rPr lang="en-US" b="1" i="0" baseline="-25000" dirty="0">
+                <a:solidFill>
+                  <a:srgbClr val="3D3B49"/>
+                </a:solidFill>
+                <a:effectLst/>
+                <a:latin typeface="Noto serif"/>
+              </a:rPr>
+              <a:t>2</a:t>
+            </a:r>
+            <a:r>
+              <a:rPr lang="en-US" b="0" i="0" dirty="0">
+                <a:solidFill>
+                  <a:srgbClr val="3D3B49"/>
+                </a:solidFill>
+                <a:effectLst/>
+                <a:latin typeface="Noto serif"/>
+              </a:rPr>
+              <a:t> and a pass-forward value, and so on down the line. This is similar to what we saw with the Fibonacci sequence, and I always find that to be a handy mnemonic when trying to remember how an RNN works.</a:t>
+            </a:r>
+            <a:endParaRPr lang="en-US" dirty="0"/>
+          </a:p>
+        </p:txBody>
+      </p:sp>
+      <p:sp>
+        <p:nvSpPr>
+          <p:cNvPr id="4" name="Slide Number Placeholder 3"/>
+          <p:cNvSpPr>
+            <a:spLocks noGrp="1"/>
+          </p:cNvSpPr>
+          <p:nvPr>
+            <p:ph type="sldNum" sz="quarter" idx="5"/>
+          </p:nvPr>
+        </p:nvSpPr>
+        <p:spPr/>
+        <p:txBody>
+          <a:bodyPr/>
+          <a:lstStyle/>
+          <a:p>
+            <a:fld id="{3148858F-F1DB-4027-9C85-CCA6849540DD}" type="slidenum">
+              <a:rPr lang="en-US" smtClean="0"/>
+              <a:t>16</a:t>
             </a:fld>
             <a:endParaRPr lang="en-US"/>
           </a:p>
@@ -2235,11 +2320,8 @@
             </a:pPr>
             <a:r>
               <a:rPr lang="en-US" dirty="0"/>
-              <a:t>Exercise 5.01 starts on page 221 of the textbook.  For additional information, please watch the exercise 5.01 orientation video.</a:t>
-            </a:r>
-          </a:p>
-          <a:p>
-            <a:endParaRPr lang="en-US" dirty="0"/>
+              <a:t>Exercise 5.01 starts on page 221 of the textbook.  </a:t>
+            </a:r>
           </a:p>
         </p:txBody>
       </p:sp>
@@ -2741,7 +2823,7 @@
           <a:p>
             <a:fld id="{C3F78080-8D0A-4BE8-A5B4-CB115102D524}" type="datetimeFigureOut">
               <a:rPr lang="en-US" smtClean="0"/>
-              <a:t>11/23/2021</a:t>
+              <a:t>3/16/2022</a:t>
             </a:fld>
             <a:endParaRPr lang="en-US"/>
           </a:p>
@@ -2939,7 +3021,7 @@
           <a:p>
             <a:fld id="{C3F78080-8D0A-4BE8-A5B4-CB115102D524}" type="datetimeFigureOut">
               <a:rPr lang="en-US" smtClean="0"/>
-              <a:t>11/23/2021</a:t>
+              <a:t>3/16/2022</a:t>
             </a:fld>
             <a:endParaRPr lang="en-US"/>
           </a:p>
@@ -3147,7 +3229,7 @@
           <a:p>
             <a:fld id="{C3F78080-8D0A-4BE8-A5B4-CB115102D524}" type="datetimeFigureOut">
               <a:rPr lang="en-US" smtClean="0"/>
-              <a:t>11/23/2021</a:t>
+              <a:t>3/16/2022</a:t>
             </a:fld>
             <a:endParaRPr lang="en-US"/>
           </a:p>
@@ -3345,7 +3427,7 @@
           <a:p>
             <a:fld id="{C3F78080-8D0A-4BE8-A5B4-CB115102D524}" type="datetimeFigureOut">
               <a:rPr lang="en-US" smtClean="0"/>
-              <a:t>11/23/2021</a:t>
+              <a:t>3/16/2022</a:t>
             </a:fld>
             <a:endParaRPr lang="en-US"/>
           </a:p>
@@ -3620,7 +3702,7 @@
           <a:p>
             <a:fld id="{C3F78080-8D0A-4BE8-A5B4-CB115102D524}" type="datetimeFigureOut">
               <a:rPr lang="en-US" smtClean="0"/>
-              <a:t>11/23/2021</a:t>
+              <a:t>3/16/2022</a:t>
             </a:fld>
             <a:endParaRPr lang="en-US"/>
           </a:p>
@@ -3885,7 +3967,7 @@
           <a:p>
             <a:fld id="{C3F78080-8D0A-4BE8-A5B4-CB115102D524}" type="datetimeFigureOut">
               <a:rPr lang="en-US" smtClean="0"/>
-              <a:t>11/23/2021</a:t>
+              <a:t>3/16/2022</a:t>
             </a:fld>
             <a:endParaRPr lang="en-US"/>
           </a:p>
@@ -4297,7 +4379,7 @@
           <a:p>
             <a:fld id="{C3F78080-8D0A-4BE8-A5B4-CB115102D524}" type="datetimeFigureOut">
               <a:rPr lang="en-US" smtClean="0"/>
-              <a:t>11/23/2021</a:t>
+              <a:t>3/16/2022</a:t>
             </a:fld>
             <a:endParaRPr lang="en-US"/>
           </a:p>
@@ -4438,7 +4520,7 @@
           <a:p>
             <a:fld id="{C3F78080-8D0A-4BE8-A5B4-CB115102D524}" type="datetimeFigureOut">
               <a:rPr lang="en-US" smtClean="0"/>
-              <a:t>11/23/2021</a:t>
+              <a:t>3/16/2022</a:t>
             </a:fld>
             <a:endParaRPr lang="en-US"/>
           </a:p>
@@ -4551,7 +4633,7 @@
           <a:p>
             <a:fld id="{C3F78080-8D0A-4BE8-A5B4-CB115102D524}" type="datetimeFigureOut">
               <a:rPr lang="en-US" smtClean="0"/>
-              <a:t>11/23/2021</a:t>
+              <a:t>3/16/2022</a:t>
             </a:fld>
             <a:endParaRPr lang="en-US"/>
           </a:p>
@@ -4862,7 +4944,7 @@
           <a:p>
             <a:fld id="{C3F78080-8D0A-4BE8-A5B4-CB115102D524}" type="datetimeFigureOut">
               <a:rPr lang="en-US" smtClean="0"/>
-              <a:t>11/23/2021</a:t>
+              <a:t>3/16/2022</a:t>
             </a:fld>
             <a:endParaRPr lang="en-US"/>
           </a:p>
@@ -5150,7 +5232,7 @@
           <a:p>
             <a:fld id="{C3F78080-8D0A-4BE8-A5B4-CB115102D524}" type="datetimeFigureOut">
               <a:rPr lang="en-US" smtClean="0"/>
-              <a:t>11/23/2021</a:t>
+              <a:t>3/16/2022</a:t>
             </a:fld>
             <a:endParaRPr lang="en-US"/>
           </a:p>
@@ -5391,7 +5473,7 @@
           <a:p>
             <a:fld id="{C3F78080-8D0A-4BE8-A5B4-CB115102D524}" type="datetimeFigureOut">
               <a:rPr lang="en-US" smtClean="0"/>
-              <a:t>11/23/2021</a:t>
+              <a:t>3/16/2022</a:t>
             </a:fld>
             <a:endParaRPr lang="en-US"/>
           </a:p>
@@ -7290,8 +7372,8 @@
         </p:nvSpPr>
         <p:spPr>
           <a:xfrm>
-            <a:off x="0" y="3385957"/>
-            <a:ext cx="12192000" cy="518830"/>
+            <a:off x="0" y="2732183"/>
+            <a:ext cx="12192000" cy="1172604"/>
           </a:xfrm>
           <a:noFill/>
         </p:spPr>
@@ -7403,7 +7485,7 @@
                 </a:solidFill>
                 <a:latin typeface="Palatino Linotype" panose="02040502050505030304" pitchFamily="18" charset="0"/>
               </a:rPr>
-              <a:t>5.03 (</a:t>
+              <a:t>(</a:t>
             </a:r>
             <a:r>
               <a:rPr lang="en-US" sz="3600" i="0" u="none" strike="noStrike" baseline="0" dirty="0">
@@ -7417,7 +7499,30 @@
               </a:rPr>
               <a:t>Building Our First Plain RNN Model)</a:t>
             </a:r>
-            <a:endParaRPr lang="en-US" sz="3600" dirty="0">
+            <a:br>
+              <a:rPr lang="en-US" sz="3600" i="0" u="none" strike="noStrike" baseline="0" dirty="0">
+                <a:solidFill>
+                  <a:schemeClr val="tx1">
+                    <a:lumMod val="65000"/>
+                    <a:lumOff val="35000"/>
+                  </a:schemeClr>
+                </a:solidFill>
+                <a:latin typeface="Palatino Linotype" panose="02040502050505030304" pitchFamily="18" charset="0"/>
+              </a:rPr>
+            </a:br>
+            <a:r>
+              <a:rPr lang="en-US" sz="2800" i="0" u="none" strike="noStrike" baseline="0" dirty="0">
+                <a:solidFill>
+                  <a:schemeClr val="tx1">
+                    <a:lumMod val="65000"/>
+                    <a:lumOff val="35000"/>
+                  </a:schemeClr>
+                </a:solidFill>
+                <a:latin typeface="Palatino Linotype" panose="02040502050505030304" pitchFamily="18" charset="0"/>
+              </a:rPr>
+              <a:t>01.2_simple_rnn.ipynb</a:t>
+            </a:r>
+            <a:endParaRPr lang="en-US" sz="2800" dirty="0">
               <a:solidFill>
                 <a:schemeClr val="tx1">
                   <a:lumMod val="65000"/>
@@ -7561,6 +7666,132 @@
           <a:chExt cx="0" cy="0"/>
         </a:xfrm>
       </p:grpSpPr>
+      <p:sp>
+        <p:nvSpPr>
+          <p:cNvPr id="3" name="Text Placeholder 2">
+            <a:extLst>
+              <a:ext uri="{FF2B5EF4-FFF2-40B4-BE49-F238E27FC236}">
+                <a16:creationId xmlns:a16="http://schemas.microsoft.com/office/drawing/2014/main" id="{098BC2D2-CCF7-4C63-8489-B46BF394FCA2}"/>
+              </a:ext>
+            </a:extLst>
+          </p:cNvPr>
+          <p:cNvSpPr>
+            <a:spLocks noGrp="1"/>
+          </p:cNvSpPr>
+          <p:nvPr>
+            <p:ph type="body" idx="1"/>
+          </p:nvPr>
+        </p:nvSpPr>
+        <p:spPr>
+          <a:xfrm>
+            <a:off x="0" y="4285400"/>
+            <a:ext cx="12192000" cy="518830"/>
+          </a:xfrm>
+        </p:spPr>
+        <p:txBody>
+          <a:bodyPr>
+            <a:normAutofit/>
+          </a:bodyPr>
+          <a:lstStyle/>
+          <a:p>
+            <a:endParaRPr lang="en-US" dirty="0">
+              <a:latin typeface="Palatino Linotype" panose="02040502050505030304" pitchFamily="18" charset="0"/>
+              <a:cs typeface="Segoe UI" panose="020B0502040204020203" pitchFamily="34" charset="0"/>
+            </a:endParaRPr>
+          </a:p>
+          <a:p>
+            <a:endParaRPr lang="en-US" dirty="0">
+              <a:latin typeface="Palatino Linotype" panose="02040502050505030304" pitchFamily="18" charset="0"/>
+              <a:cs typeface="Segoe UI" panose="020B0502040204020203" pitchFamily="34" charset="0"/>
+            </a:endParaRPr>
+          </a:p>
+          <a:p>
+            <a:endParaRPr lang="en-US" dirty="0">
+              <a:latin typeface="Palatino Linotype" panose="02040502050505030304" pitchFamily="18" charset="0"/>
+              <a:cs typeface="Segoe UI" panose="020B0502040204020203" pitchFamily="34" charset="0"/>
+            </a:endParaRPr>
+          </a:p>
+          <a:p>
+            <a:endParaRPr lang="en-US" dirty="0">
+              <a:latin typeface="Palatino Linotype" panose="02040502050505030304" pitchFamily="18" charset="0"/>
+              <a:cs typeface="Segoe UI" panose="020B0502040204020203" pitchFamily="34" charset="0"/>
+            </a:endParaRPr>
+          </a:p>
+          <a:p>
+            <a:endParaRPr lang="en-US" dirty="0">
+              <a:latin typeface="Palatino Linotype" panose="02040502050505030304" pitchFamily="18" charset="0"/>
+              <a:cs typeface="Segoe UI" panose="020B0502040204020203" pitchFamily="34" charset="0"/>
+            </a:endParaRPr>
+          </a:p>
+        </p:txBody>
+      </p:sp>
+      <p:sp>
+        <p:nvSpPr>
+          <p:cNvPr id="6" name="Title 5">
+            <a:extLst>
+              <a:ext uri="{FF2B5EF4-FFF2-40B4-BE49-F238E27FC236}">
+                <a16:creationId xmlns:a16="http://schemas.microsoft.com/office/drawing/2014/main" id="{9B5C8F48-C6FE-40B8-BF1A-1D53D40B3B57}"/>
+              </a:ext>
+            </a:extLst>
+          </p:cNvPr>
+          <p:cNvSpPr>
+            <a:spLocks noGrp="1"/>
+          </p:cNvSpPr>
+          <p:nvPr>
+            <p:ph type="title"/>
+          </p:nvPr>
+        </p:nvSpPr>
+        <p:spPr/>
+        <p:txBody>
+          <a:bodyPr/>
+          <a:lstStyle/>
+          <a:p>
+            <a:endParaRPr lang="en-US"/>
+          </a:p>
+        </p:txBody>
+      </p:sp>
+    </p:spTree>
+    <p:extLst>
+      <p:ext uri="{BB962C8B-B14F-4D97-AF65-F5344CB8AC3E}">
+        <p14:creationId xmlns:p14="http://schemas.microsoft.com/office/powerpoint/2010/main" val="2340294923"/>
+      </p:ext>
+    </p:extLst>
+  </p:cSld>
+  <p:clrMapOvr>
+    <a:masterClrMapping/>
+  </p:clrMapOvr>
+  <mc:AlternateContent xmlns:mc="http://schemas.openxmlformats.org/markup-compatibility/2006" xmlns:p14="http://schemas.microsoft.com/office/powerpoint/2010/main">
+    <mc:Choice Requires="p14">
+      <p:transition spd="med" p14:dur="700">
+        <p:fade/>
+      </p:transition>
+    </mc:Choice>
+    <mc:Fallback xmlns="">
+      <p:transition spd="med">
+        <p:fade/>
+      </p:transition>
+    </mc:Fallback>
+  </mc:AlternateContent>
+</p:sld>
+</file>
+
+<file path=ppt/slides/slide16.xml><?xml version="1.0" encoding="utf-8"?>
+<p:sld xmlns:a="http://schemas.openxmlformats.org/drawingml/2006/main" xmlns:r="http://schemas.openxmlformats.org/officeDocument/2006/relationships" xmlns:p="http://schemas.openxmlformats.org/presentationml/2006/main">
+  <p:cSld>
+    <p:spTree>
+      <p:nvGrpSpPr>
+        <p:cNvPr id="1" name=""/>
+        <p:cNvGrpSpPr/>
+        <p:nvPr/>
+      </p:nvGrpSpPr>
+      <p:grpSpPr>
+        <a:xfrm>
+          <a:off x="0" y="0"/>
+          <a:ext cx="0" cy="0"/>
+          <a:chOff x="0" y="0"/>
+          <a:chExt cx="0" cy="0"/>
+        </a:xfrm>
+      </p:grpSpPr>
       <p:pic>
         <p:nvPicPr>
           <p:cNvPr id="6146" name="Picture 2" descr="Recurrent neurons in time steps">
@@ -8682,8 +8913,8 @@
         </p:nvSpPr>
         <p:spPr>
           <a:xfrm>
-            <a:off x="0" y="3385955"/>
-            <a:ext cx="12192000" cy="518831"/>
+            <a:off x="0" y="2721167"/>
+            <a:ext cx="12192000" cy="1090669"/>
           </a:xfrm>
           <a:noFill/>
         </p:spPr>
@@ -8795,9 +9026,44 @@
                 </a:solidFill>
                 <a:latin typeface="Palatino Linotype" panose="02040502050505030304" pitchFamily="18" charset="0"/>
               </a:rPr>
-              <a:t>5.01 (Visualizing Time Series Data)</a:t>
-            </a:r>
-            <a:endParaRPr lang="en-US" sz="3600" dirty="0">
+              <a:t>(Visualizing Time Series Data)</a:t>
+            </a:r>
+            <a:br>
+              <a:rPr lang="en-US" sz="3600" dirty="0">
+                <a:solidFill>
+                  <a:schemeClr val="tx1">
+                    <a:lumMod val="65000"/>
+                    <a:lumOff val="35000"/>
+                  </a:schemeClr>
+                </a:solidFill>
+                <a:latin typeface="Palatino Linotype" panose="02040502050505030304" pitchFamily="18" charset="0"/>
+              </a:rPr>
+            </a:br>
+            <a:r>
+              <a:rPr lang="en-US" sz="3600" dirty="0">
+                <a:solidFill>
+                  <a:schemeClr val="tx1">
+                    <a:lumMod val="65000"/>
+                    <a:lumOff val="35000"/>
+                  </a:schemeClr>
+                </a:solidFill>
+                <a:latin typeface="Palatino Linotype" panose="02040502050505030304" pitchFamily="18" charset="0"/>
+              </a:rPr>
+              <a:t>     </a:t>
+            </a:r>
+            <a:r>
+              <a:rPr lang="en-US" sz="2800" dirty="0">
+                <a:solidFill>
+                  <a:schemeClr val="tx1">
+                    <a:lumMod val="65000"/>
+                    <a:lumOff val="35000"/>
+                  </a:schemeClr>
+                </a:solidFill>
+                <a:latin typeface="Palatino Linotype" panose="02040502050505030304" pitchFamily="18" charset="0"/>
+              </a:rPr>
+              <a:t>01.1_data_visualize.ipynb</a:t>
+            </a:r>
+            <a:endParaRPr lang="en-US" sz="2800" dirty="0">
               <a:solidFill>
                 <a:schemeClr val="tx1">
                   <a:lumMod val="65000"/>
@@ -8806,65 +9072,6 @@
               </a:solidFill>
               <a:latin typeface="Palatino Linotype" panose="02040502050505030304" pitchFamily="18" charset="0"/>
               <a:cs typeface="Segoe UI Light" panose="020B0502040204020203" pitchFamily="34" charset="0"/>
-            </a:endParaRPr>
-          </a:p>
-        </p:txBody>
-      </p:sp>
-      <p:sp>
-        <p:nvSpPr>
-          <p:cNvPr id="3" name="Text Placeholder 2">
-            <a:extLst>
-              <a:ext uri="{FF2B5EF4-FFF2-40B4-BE49-F238E27FC236}">
-                <a16:creationId xmlns:a16="http://schemas.microsoft.com/office/drawing/2014/main" id="{098BC2D2-CCF7-4C63-8489-B46BF394FCA2}"/>
-              </a:ext>
-            </a:extLst>
-          </p:cNvPr>
-          <p:cNvSpPr>
-            <a:spLocks noGrp="1"/>
-          </p:cNvSpPr>
-          <p:nvPr>
-            <p:ph type="body" idx="1"/>
-          </p:nvPr>
-        </p:nvSpPr>
-        <p:spPr>
-          <a:xfrm>
-            <a:off x="0" y="4285400"/>
-            <a:ext cx="12192000" cy="518830"/>
-          </a:xfrm>
-        </p:spPr>
-        <p:txBody>
-          <a:bodyPr>
-            <a:normAutofit/>
-          </a:bodyPr>
-          <a:lstStyle/>
-          <a:p>
-            <a:endParaRPr lang="en-US" dirty="0">
-              <a:latin typeface="Palatino Linotype" panose="02040502050505030304" pitchFamily="18" charset="0"/>
-              <a:cs typeface="Segoe UI" panose="020B0502040204020203" pitchFamily="34" charset="0"/>
-            </a:endParaRPr>
-          </a:p>
-          <a:p>
-            <a:endParaRPr lang="en-US" dirty="0">
-              <a:latin typeface="Palatino Linotype" panose="02040502050505030304" pitchFamily="18" charset="0"/>
-              <a:cs typeface="Segoe UI" panose="020B0502040204020203" pitchFamily="34" charset="0"/>
-            </a:endParaRPr>
-          </a:p>
-          <a:p>
-            <a:endParaRPr lang="en-US" dirty="0">
-              <a:latin typeface="Palatino Linotype" panose="02040502050505030304" pitchFamily="18" charset="0"/>
-              <a:cs typeface="Segoe UI" panose="020B0502040204020203" pitchFamily="34" charset="0"/>
-            </a:endParaRPr>
-          </a:p>
-          <a:p>
-            <a:endParaRPr lang="en-US" dirty="0">
-              <a:latin typeface="Palatino Linotype" panose="02040502050505030304" pitchFamily="18" charset="0"/>
-              <a:cs typeface="Segoe UI" panose="020B0502040204020203" pitchFamily="34" charset="0"/>
-            </a:endParaRPr>
-          </a:p>
-          <a:p>
-            <a:endParaRPr lang="en-US" dirty="0">
-              <a:latin typeface="Palatino Linotype" panose="02040502050505030304" pitchFamily="18" charset="0"/>
-              <a:cs typeface="Segoe UI" panose="020B0502040204020203" pitchFamily="34" charset="0"/>
             </a:endParaRPr>
           </a:p>
         </p:txBody>

</xml_diff>